<commit_message>
Update the meeting files 09102025
</commit_message>
<xml_diff>
--- a/9.10 group meeting/Emacs files/figures/fig1_illustration_sropinf.pptx
+++ b/9.10 group meeting/Emacs files/figures/fig1_illustration_sropinf.pptx
@@ -259,7 +259,7 @@
           <a:p>
             <a:fld id="{2E433DCA-7DE4-0E43-BC86-085FD8A6E196}" type="datetimeFigureOut">
               <a:rPr lang="en-US" smtClean="0"/>
-              <a:t>9/7/25</a:t>
+              <a:t>9/9/25</a:t>
             </a:fld>
             <a:endParaRPr lang="en-US"/>
           </a:p>
@@ -457,7 +457,7 @@
           <a:p>
             <a:fld id="{2E433DCA-7DE4-0E43-BC86-085FD8A6E196}" type="datetimeFigureOut">
               <a:rPr lang="en-US" smtClean="0"/>
-              <a:t>9/7/25</a:t>
+              <a:t>9/9/25</a:t>
             </a:fld>
             <a:endParaRPr lang="en-US"/>
           </a:p>
@@ -665,7 +665,7 @@
           <a:p>
             <a:fld id="{2E433DCA-7DE4-0E43-BC86-085FD8A6E196}" type="datetimeFigureOut">
               <a:rPr lang="en-US" smtClean="0"/>
-              <a:t>9/7/25</a:t>
+              <a:t>9/9/25</a:t>
             </a:fld>
             <a:endParaRPr lang="en-US"/>
           </a:p>
@@ -863,7 +863,7 @@
           <a:p>
             <a:fld id="{2E433DCA-7DE4-0E43-BC86-085FD8A6E196}" type="datetimeFigureOut">
               <a:rPr lang="en-US" smtClean="0"/>
-              <a:t>9/7/25</a:t>
+              <a:t>9/9/25</a:t>
             </a:fld>
             <a:endParaRPr lang="en-US"/>
           </a:p>
@@ -1138,7 +1138,7 @@
           <a:p>
             <a:fld id="{2E433DCA-7DE4-0E43-BC86-085FD8A6E196}" type="datetimeFigureOut">
               <a:rPr lang="en-US" smtClean="0"/>
-              <a:t>9/7/25</a:t>
+              <a:t>9/9/25</a:t>
             </a:fld>
             <a:endParaRPr lang="en-US"/>
           </a:p>
@@ -1403,7 +1403,7 @@
           <a:p>
             <a:fld id="{2E433DCA-7DE4-0E43-BC86-085FD8A6E196}" type="datetimeFigureOut">
               <a:rPr lang="en-US" smtClean="0"/>
-              <a:t>9/7/25</a:t>
+              <a:t>9/9/25</a:t>
             </a:fld>
             <a:endParaRPr lang="en-US"/>
           </a:p>
@@ -1815,7 +1815,7 @@
           <a:p>
             <a:fld id="{2E433DCA-7DE4-0E43-BC86-085FD8A6E196}" type="datetimeFigureOut">
               <a:rPr lang="en-US" smtClean="0"/>
-              <a:t>9/7/25</a:t>
+              <a:t>9/9/25</a:t>
             </a:fld>
             <a:endParaRPr lang="en-US"/>
           </a:p>
@@ -1956,7 +1956,7 @@
           <a:p>
             <a:fld id="{2E433DCA-7DE4-0E43-BC86-085FD8A6E196}" type="datetimeFigureOut">
               <a:rPr lang="en-US" smtClean="0"/>
-              <a:t>9/7/25</a:t>
+              <a:t>9/9/25</a:t>
             </a:fld>
             <a:endParaRPr lang="en-US"/>
           </a:p>
@@ -2069,7 +2069,7 @@
           <a:p>
             <a:fld id="{2E433DCA-7DE4-0E43-BC86-085FD8A6E196}" type="datetimeFigureOut">
               <a:rPr lang="en-US" smtClean="0"/>
-              <a:t>9/7/25</a:t>
+              <a:t>9/9/25</a:t>
             </a:fld>
             <a:endParaRPr lang="en-US"/>
           </a:p>
@@ -2380,7 +2380,7 @@
           <a:p>
             <a:fld id="{2E433DCA-7DE4-0E43-BC86-085FD8A6E196}" type="datetimeFigureOut">
               <a:rPr lang="en-US" smtClean="0"/>
-              <a:t>9/7/25</a:t>
+              <a:t>9/9/25</a:t>
             </a:fld>
             <a:endParaRPr lang="en-US"/>
           </a:p>
@@ -2668,7 +2668,7 @@
           <a:p>
             <a:fld id="{2E433DCA-7DE4-0E43-BC86-085FD8A6E196}" type="datetimeFigureOut">
               <a:rPr lang="en-US" smtClean="0"/>
-              <a:t>9/7/25</a:t>
+              <a:t>9/9/25</a:t>
             </a:fld>
             <a:endParaRPr lang="en-US"/>
           </a:p>
@@ -2909,7 +2909,7 @@
           <a:p>
             <a:fld id="{2E433DCA-7DE4-0E43-BC86-085FD8A6E196}" type="datetimeFigureOut">
               <a:rPr lang="en-US" smtClean="0"/>
-              <a:t>9/7/25</a:t>
+              <a:t>9/9/25</a:t>
             </a:fld>
             <a:endParaRPr lang="en-US"/>
           </a:p>
@@ -3458,12 +3458,12 @@
             </p:cNvPicPr>
             <p:nvPr>
               <p:custDataLst>
-                <p:tags r:id="rId20"/>
+                <p:tags r:id="rId19"/>
               </p:custDataLst>
             </p:nvPr>
           </p:nvPicPr>
           <p:blipFill>
-            <a:blip r:embed="rId23"/>
+            <a:blip r:embed="rId22"/>
             <a:stretch>
               <a:fillRect/>
             </a:stretch>
@@ -3492,12 +3492,12 @@
             </p:cNvPicPr>
             <p:nvPr>
               <p:custDataLst>
-                <p:tags r:id="rId21"/>
+                <p:tags r:id="rId20"/>
               </p:custDataLst>
             </p:nvPr>
           </p:nvPicPr>
           <p:blipFill>
-            <a:blip r:embed="rId24"/>
+            <a:blip r:embed="rId23"/>
             <a:stretch>
               <a:fillRect/>
             </a:stretch>
@@ -3750,12 +3750,12 @@
             </p:cNvPicPr>
             <p:nvPr>
               <p:custDataLst>
-                <p:tags r:id="rId18"/>
+                <p:tags r:id="rId17"/>
               </p:custDataLst>
             </p:nvPr>
           </p:nvPicPr>
           <p:blipFill>
-            <a:blip r:embed="rId25"/>
+            <a:blip r:embed="rId24"/>
             <a:stretch>
               <a:fillRect/>
             </a:stretch>
@@ -3784,12 +3784,12 @@
             </p:cNvPicPr>
             <p:nvPr>
               <p:custDataLst>
-                <p:tags r:id="rId19"/>
+                <p:tags r:id="rId18"/>
               </p:custDataLst>
             </p:nvPr>
           </p:nvPicPr>
           <p:blipFill>
-            <a:blip r:embed="rId26"/>
+            <a:blip r:embed="rId25"/>
             <a:stretch>
               <a:fillRect/>
             </a:stretch>
@@ -3929,12 +3929,12 @@
             </p:cNvPicPr>
             <p:nvPr>
               <p:custDataLst>
-                <p:tags r:id="rId17"/>
+                <p:tags r:id="rId16"/>
               </p:custDataLst>
             </p:nvPr>
           </p:nvPicPr>
           <p:blipFill>
-            <a:blip r:embed="rId27"/>
+            <a:blip r:embed="rId26"/>
             <a:stretch>
               <a:fillRect/>
             </a:stretch>
@@ -4076,12 +4076,12 @@
             </p:cNvPicPr>
             <p:nvPr>
               <p:custDataLst>
-                <p:tags r:id="rId16"/>
+                <p:tags r:id="rId15"/>
               </p:custDataLst>
             </p:nvPr>
           </p:nvPicPr>
           <p:blipFill>
-            <a:blip r:embed="rId28"/>
+            <a:blip r:embed="rId27"/>
             <a:stretch>
               <a:fillRect/>
             </a:stretch>
@@ -4116,7 +4116,7 @@
           </p:nvPr>
         </p:nvPicPr>
         <p:blipFill>
-          <a:blip r:embed="rId29"/>
+          <a:blip r:embed="rId28"/>
           <a:stretch>
             <a:fillRect/>
           </a:stretch>
@@ -4237,10 +4237,10 @@
       </p:grpSp>
       <p:grpSp>
         <p:nvGrpSpPr>
-          <p:cNvPr id="49" name="Group 48">
-            <a:extLst>
-              <a:ext uri="{FF2B5EF4-FFF2-40B4-BE49-F238E27FC236}">
-                <a16:creationId xmlns:a16="http://schemas.microsoft.com/office/drawing/2014/main" id="{189CD829-7CFD-61FB-81C9-BE95618B8215}"/>
+          <p:cNvPr id="12" name="Group 11">
+            <a:extLst>
+              <a:ext uri="{FF2B5EF4-FFF2-40B4-BE49-F238E27FC236}">
+                <a16:creationId xmlns:a16="http://schemas.microsoft.com/office/drawing/2014/main" id="{74B94B5A-D5EA-EE2A-0C82-24983F740A12}"/>
               </a:ext>
             </a:extLst>
           </p:cNvPr>
@@ -4349,10 +4349,10 @@
         </p:sp>
         <p:pic>
           <p:nvPicPr>
-            <p:cNvPr id="48" name="Picture 47">
+            <p:cNvPr id="11" name="Picture 10">
               <a:extLst>
                 <a:ext uri="{FF2B5EF4-FFF2-40B4-BE49-F238E27FC236}">
-                  <a16:creationId xmlns:a16="http://schemas.microsoft.com/office/drawing/2014/main" id="{19B95FCA-CDAA-3B7D-9E68-AB8DC04D8A84}"/>
+                  <a16:creationId xmlns:a16="http://schemas.microsoft.com/office/drawing/2014/main" id="{CD752808-645D-C6FA-1BFA-9FFE98DB44E2}"/>
                 </a:ext>
               </a:extLst>
             </p:cNvPr>
@@ -4361,20 +4361,20 @@
             </p:cNvPicPr>
             <p:nvPr>
               <p:custDataLst>
-                <p:tags r:id="rId15"/>
+                <p:tags r:id="rId14"/>
               </p:custDataLst>
             </p:nvPr>
           </p:nvPicPr>
           <p:blipFill>
-            <a:blip r:embed="rId30"/>
+            <a:blip r:embed="rId29"/>
             <a:stretch>
               <a:fillRect/>
             </a:stretch>
           </p:blipFill>
           <p:spPr>
             <a:xfrm>
-              <a:off x="3154762" y="2549128"/>
-              <a:ext cx="2019164" cy="581082"/>
+              <a:off x="3158356" y="2549129"/>
+              <a:ext cx="2068999" cy="543889"/>
             </a:xfrm>
             <a:prstGeom prst="rect">
               <a:avLst/>
@@ -4505,7 +4505,7 @@
           </p:nvPr>
         </p:nvPicPr>
         <p:blipFill>
-          <a:blip r:embed="rId31"/>
+          <a:blip r:embed="rId30"/>
           <a:stretch>
             <a:fillRect/>
           </a:stretch>
@@ -4539,7 +4539,7 @@
           </p:nvPr>
         </p:nvPicPr>
         <p:blipFill>
-          <a:blip r:embed="rId32"/>
+          <a:blip r:embed="rId31"/>
           <a:stretch>
             <a:fillRect/>
           </a:stretch>
@@ -4586,7 +4586,7 @@
             <p:cNvGrpSpPr/>
             <p:nvPr>
               <p:custDataLst>
-                <p:tags r:id="rId10"/>
+                <p:tags r:id="rId9"/>
               </p:custDataLst>
             </p:nvPr>
           </p:nvGrpSpPr>
@@ -4704,12 +4704,12 @@
               </p:cNvPicPr>
               <p:nvPr>
                 <p:custDataLst>
-                  <p:tags r:id="rId13"/>
+                  <p:tags r:id="rId12"/>
                 </p:custDataLst>
               </p:nvPr>
             </p:nvPicPr>
             <p:blipFill>
-              <a:blip r:embed="rId33"/>
+              <a:blip r:embed="rId32"/>
               <a:stretch>
                 <a:fillRect/>
               </a:stretch>
@@ -4738,12 +4738,12 @@
               </p:cNvPicPr>
               <p:nvPr>
                 <p:custDataLst>
-                  <p:tags r:id="rId14"/>
+                  <p:tags r:id="rId13"/>
                 </p:custDataLst>
               </p:nvPr>
             </p:nvPicPr>
             <p:blipFill>
-              <a:blip r:embed="rId34"/>
+              <a:blip r:embed="rId33"/>
               <a:stretch>
                 <a:fillRect/>
               </a:stretch>
@@ -4773,12 +4773,12 @@
             </p:cNvPicPr>
             <p:nvPr>
               <p:custDataLst>
-                <p:tags r:id="rId11"/>
+                <p:tags r:id="rId10"/>
               </p:custDataLst>
             </p:nvPr>
           </p:nvPicPr>
           <p:blipFill>
-            <a:blip r:embed="rId35"/>
+            <a:blip r:embed="rId34"/>
             <a:stretch>
               <a:fillRect/>
             </a:stretch>
@@ -4807,12 +4807,12 @@
             </p:cNvPicPr>
             <p:nvPr>
               <p:custDataLst>
-                <p:tags r:id="rId12"/>
+                <p:tags r:id="rId11"/>
               </p:custDataLst>
             </p:nvPr>
           </p:nvPicPr>
           <p:blipFill>
-            <a:blip r:embed="rId36"/>
+            <a:blip r:embed="rId35"/>
             <a:stretch>
               <a:fillRect/>
             </a:stretch>
@@ -4934,10 +4934,10 @@
       </p:grpSp>
       <p:grpSp>
         <p:nvGrpSpPr>
-          <p:cNvPr id="150" name="Group 149">
-            <a:extLst>
-              <a:ext uri="{FF2B5EF4-FFF2-40B4-BE49-F238E27FC236}">
-                <a16:creationId xmlns:a16="http://schemas.microsoft.com/office/drawing/2014/main" id="{4203674B-F8C6-2063-9AA0-663F961DBA21}"/>
+          <p:cNvPr id="10" name="Group 9">
+            <a:extLst>
+              <a:ext uri="{FF2B5EF4-FFF2-40B4-BE49-F238E27FC236}">
+                <a16:creationId xmlns:a16="http://schemas.microsoft.com/office/drawing/2014/main" id="{0252312A-DDB4-9140-B84B-145F6401291E}"/>
               </a:ext>
             </a:extLst>
           </p:cNvPr>
@@ -4948,7 +4948,7 @@
           <a:xfrm>
             <a:off x="3061149" y="3593261"/>
             <a:ext cx="7539511" cy="1350884"/>
-            <a:chOff x="3061148" y="3841377"/>
+            <a:chOff x="3061149" y="3593261"/>
             <a:chExt cx="7539511" cy="1350884"/>
           </a:xfrm>
         </p:grpSpPr>
@@ -4966,7 +4966,7 @@
           </p:nvSpPr>
           <p:spPr>
             <a:xfrm>
-              <a:off x="3061148" y="3841377"/>
+              <a:off x="3061149" y="3593261"/>
               <a:ext cx="7539511" cy="1350884"/>
             </a:xfrm>
             <a:prstGeom prst="rect">
@@ -5020,7 +5020,7 @@
           </p:nvSpPr>
           <p:spPr>
             <a:xfrm>
-              <a:off x="5514829" y="3883638"/>
+              <a:off x="5514830" y="3635522"/>
               <a:ext cx="2173496" cy="400110"/>
             </a:xfrm>
             <a:prstGeom prst="rect">
@@ -5046,10 +5046,10 @@
         </p:sp>
         <p:pic>
           <p:nvPicPr>
-            <p:cNvPr id="149" name="Picture 148">
+            <p:cNvPr id="9" name="Picture 8">
               <a:extLst>
                 <a:ext uri="{FF2B5EF4-FFF2-40B4-BE49-F238E27FC236}">
-                  <a16:creationId xmlns:a16="http://schemas.microsoft.com/office/drawing/2014/main" id="{12D732A9-F9A9-9FDF-B338-B94072E899A8}"/>
+                  <a16:creationId xmlns:a16="http://schemas.microsoft.com/office/drawing/2014/main" id="{2FE5BB3F-B181-6869-3033-877DD8579E5D}"/>
                 </a:ext>
               </a:extLst>
             </p:cNvPr>
@@ -5058,20 +5058,20 @@
             </p:cNvPicPr>
             <p:nvPr>
               <p:custDataLst>
-                <p:tags r:id="rId9"/>
+                <p:tags r:id="rId8"/>
               </p:custDataLst>
             </p:nvPr>
           </p:nvPicPr>
           <p:blipFill>
-            <a:blip r:embed="rId37"/>
+            <a:blip r:embed="rId36"/>
             <a:stretch>
               <a:fillRect/>
             </a:stretch>
           </p:blipFill>
           <p:spPr>
             <a:xfrm>
-              <a:off x="3719214" y="4228317"/>
-              <a:ext cx="6199632" cy="597408"/>
+              <a:off x="3264745" y="3990395"/>
+              <a:ext cx="7132320" cy="597408"/>
             </a:xfrm>
             <a:prstGeom prst="rect">
               <a:avLst/>
@@ -5098,7 +5098,7 @@
           </p:nvPr>
         </p:nvPicPr>
         <p:blipFill>
-          <a:blip r:embed="rId38"/>
+          <a:blip r:embed="rId37"/>
           <a:stretch>
             <a:fillRect/>
           </a:stretch>
@@ -5257,26 +5257,22 @@
       </p:grpSp>
       <p:grpSp>
         <p:nvGrpSpPr>
-          <p:cNvPr id="20" name="Group 19">
-            <a:extLst>
-              <a:ext uri="{FF2B5EF4-FFF2-40B4-BE49-F238E27FC236}">
-                <a16:creationId xmlns:a16="http://schemas.microsoft.com/office/drawing/2014/main" id="{03033FB5-2E08-C9C4-E146-77A5886564AB}"/>
+          <p:cNvPr id="38" name="Group 37">
+            <a:extLst>
+              <a:ext uri="{FF2B5EF4-FFF2-40B4-BE49-F238E27FC236}">
+                <a16:creationId xmlns:a16="http://schemas.microsoft.com/office/drawing/2014/main" id="{DCA6045A-1FE7-0F65-E363-DF479B22D2DB}"/>
               </a:ext>
             </a:extLst>
           </p:cNvPr>
           <p:cNvGrpSpPr/>
-          <p:nvPr>
-            <p:custDataLst>
-              <p:tags r:id="rId5"/>
-            </p:custDataLst>
-          </p:nvPr>
+          <p:nvPr/>
         </p:nvGrpSpPr>
         <p:grpSpPr>
           <a:xfrm>
             <a:off x="2713525" y="5079372"/>
-            <a:ext cx="8219995" cy="1620898"/>
+            <a:ext cx="8724536" cy="1620898"/>
             <a:chOff x="2713525" y="5079372"/>
-            <a:chExt cx="8219995" cy="1620898"/>
+            <a:chExt cx="8724536" cy="1620898"/>
           </a:xfrm>
         </p:grpSpPr>
         <p:sp>
@@ -5294,7 +5290,7 @@
           <p:spPr>
             <a:xfrm>
               <a:off x="2713525" y="5079372"/>
-              <a:ext cx="8219995" cy="1620898"/>
+              <a:ext cx="8724536" cy="1620898"/>
             </a:xfrm>
             <a:prstGeom prst="rect">
               <a:avLst/>
@@ -5373,10 +5369,10 @@
         </p:sp>
         <p:pic>
           <p:nvPicPr>
-            <p:cNvPr id="19" name="Picture 18">
+            <p:cNvPr id="33" name="Picture 32">
               <a:extLst>
                 <a:ext uri="{FF2B5EF4-FFF2-40B4-BE49-F238E27FC236}">
-                  <a16:creationId xmlns:a16="http://schemas.microsoft.com/office/drawing/2014/main" id="{0AF1E098-7EE9-CCBC-C95A-5A78B88555FD}"/>
+                  <a16:creationId xmlns:a16="http://schemas.microsoft.com/office/drawing/2014/main" id="{4F42443C-5EEC-F481-3335-EB18C746839E}"/>
                 </a:ext>
               </a:extLst>
             </p:cNvPr>
@@ -5385,20 +5381,20 @@
             </p:cNvPicPr>
             <p:nvPr>
               <p:custDataLst>
-                <p:tags r:id="rId8"/>
+                <p:tags r:id="rId7"/>
               </p:custDataLst>
             </p:nvPr>
           </p:nvPicPr>
           <p:blipFill>
-            <a:blip r:embed="rId39"/>
+            <a:blip r:embed="rId38"/>
             <a:stretch>
               <a:fillRect/>
             </a:stretch>
           </p:blipFill>
           <p:spPr>
             <a:xfrm>
-              <a:off x="2840090" y="5616891"/>
-              <a:ext cx="7964817" cy="677825"/>
+              <a:off x="2840091" y="5616893"/>
+              <a:ext cx="8477282" cy="677825"/>
             </a:xfrm>
             <a:prstGeom prst="rect">
               <a:avLst/>
@@ -5502,12 +5498,12 @@
           </p:cNvPicPr>
           <p:nvPr>
             <p:custDataLst>
-              <p:tags r:id="rId6"/>
+              <p:tags r:id="rId5"/>
             </p:custDataLst>
           </p:nvPr>
         </p:nvPicPr>
         <p:blipFill>
-          <a:blip r:embed="rId40"/>
+          <a:blip r:embed="rId39"/>
           <a:stretch>
             <a:fillRect/>
           </a:stretch>
@@ -5536,12 +5532,12 @@
           </p:cNvPicPr>
           <p:nvPr>
             <p:custDataLst>
-              <p:tags r:id="rId7"/>
+              <p:tags r:id="rId6"/>
             </p:custDataLst>
           </p:nvPr>
         </p:nvPicPr>
         <p:blipFill>
-          <a:blip r:embed="rId41"/>
+          <a:blip r:embed="rId40"/>
           <a:stretch>
             <a:fillRect/>
           </a:stretch>
@@ -5593,13 +5589,6 @@
 
 <file path=ppt/tags/tag10.xml><?xml version="1.0" encoding="utf-8"?>
 <p:tagLst xmlns:a="http://schemas.openxmlformats.org/drawingml/2006/main" xmlns:r="http://schemas.openxmlformats.org/officeDocument/2006/relationships" xmlns:p="http://schemas.openxmlformats.org/presentationml/2006/main">
-  <p:tag name="SELECTIONNAME" val="Group 105"/>
-  <p:tag name="LAYER" val="2"/>
-</p:tagLst>
-</file>
-
-<file path=ppt/tags/tag11.xml><?xml version="1.0" encoding="utf-8"?>
-<p:tagLst xmlns:a="http://schemas.openxmlformats.org/drawingml/2006/main" xmlns:r="http://schemas.openxmlformats.org/officeDocument/2006/relationships" xmlns:p="http://schemas.openxmlformats.org/presentationml/2006/main">
   <p:tag name="OUTPUTDPI" val=" 1200"/>
   <p:tag name="ORIGINALHEIGHT" val=" 125"/>
   <p:tag name="ORIGINALWIDTH" val=" 636"/>
@@ -5620,7 +5609,7 @@
 </p:tagLst>
 </file>
 
-<file path=ppt/tags/tag12.xml><?xml version="1.0" encoding="utf-8"?>
+<file path=ppt/tags/tag11.xml><?xml version="1.0" encoding="utf-8"?>
 <p:tagLst xmlns:a="http://schemas.openxmlformats.org/drawingml/2006/main" xmlns:r="http://schemas.openxmlformats.org/officeDocument/2006/relationships" xmlns:p="http://schemas.openxmlformats.org/presentationml/2006/main">
   <p:tag name="OUTPUTDPI" val=" 1200"/>
   <p:tag name="ORIGINALHEIGHT" val=" 125"/>
@@ -5642,7 +5631,7 @@
 </p:tagLst>
 </file>
 
-<file path=ppt/tags/tag13.xml><?xml version="1.0" encoding="utf-8"?>
+<file path=ppt/tags/tag12.xml><?xml version="1.0" encoding="utf-8"?>
 <p:tagLst xmlns:a="http://schemas.openxmlformats.org/drawingml/2006/main" xmlns:r="http://schemas.openxmlformats.org/officeDocument/2006/relationships" xmlns:p="http://schemas.openxmlformats.org/presentationml/2006/main">
   <p:tag name="OUTPUTDPI" val=" 1200"/>
   <p:tag name="ORIGINALHEIGHT" val=" 139"/>
@@ -5664,7 +5653,7 @@
 </p:tagLst>
 </file>
 
-<file path=ppt/tags/tag14.xml><?xml version="1.0" encoding="utf-8"?>
+<file path=ppt/tags/tag13.xml><?xml version="1.0" encoding="utf-8"?>
 <p:tagLst xmlns:a="http://schemas.openxmlformats.org/drawingml/2006/main" xmlns:r="http://schemas.openxmlformats.org/officeDocument/2006/relationships" xmlns:p="http://schemas.openxmlformats.org/presentationml/2006/main">
   <p:tag name="OUTPUTDPI" val=" 1200"/>
   <p:tag name="ORIGINALHEIGHT" val=" 125"/>
@@ -5686,16 +5675,16 @@
 </p:tagLst>
 </file>
 
-<file path=ppt/tags/tag15.xml><?xml version="1.0" encoding="utf-8"?>
+<file path=ppt/tags/tag14.xml><?xml version="1.0" encoding="utf-8"?>
 <p:tagLst xmlns:a="http://schemas.openxmlformats.org/drawingml/2006/main" xmlns:r="http://schemas.openxmlformats.org/officeDocument/2006/relationships" xmlns:p="http://schemas.openxmlformats.org/presentationml/2006/main">
   <p:tag name="OUTPUTDPI" val=" 3000"/>
   <p:tag name="ORIGINALHEIGHT" val=" 735"/>
-  <p:tag name="ORIGINALWIDTH" val=" 2554"/>
+  <p:tag name="ORIGINALWIDTH" val=" 2796"/>
   <p:tag name="OUTPUTTYPE" val="PNG"/>
   <p:tag name="IGUANATEXVERSION" val="162"/>
-  <p:tag name="LATEXADDIN" val="\documentclass{article}&#10;\usepackage{amsmath}&#10;\pagestyle{empty}&#10;\begin{document}&#10;&#10;&#10;\begin{equation}&#10;\dot{c}(t) = \frac{\langle f(\hat{u}), \partial_x u_0\rangle}{\langle\partial_x \hat{u}, \partial_x u_0\rangle}\notag&#10;\end{equation}&#10;&#10;&#10;&#10;\end{document}"/>
+  <p:tag name="LATEXADDIN" val="\documentclass{article}&#10;\usepackage{amsmath}&#10;\pagestyle{empty}&#10;\begin{document}&#10;&#10;&#10;\begin{equation}&#10;\dot{c}(t) = -\frac{\langle f(\hat{u}), \partial_x u_0\rangle}{\langle\partial_x \hat{u}, \partial_x u_0\rangle}\notag&#10;\end{equation}&#10;&#10;&#10;&#10;\end{document}"/>
   <p:tag name="IGUANATEXSIZE" val="20"/>
-  <p:tag name="IGUANATEXCURSOR" val="216"/>
+  <p:tag name="IGUANATEXCURSOR" val="113"/>
   <p:tag name="TRANSPARENCY" val="True"/>
   <p:tag name="CHOOSECOLOR" val="False"/>
   <p:tag name="COLORHEX" val="000000"/>
@@ -5708,7 +5697,7 @@
 </p:tagLst>
 </file>
 
-<file path=ppt/tags/tag16.xml><?xml version="1.0" encoding="utf-8"?>
+<file path=ppt/tags/tag15.xml><?xml version="1.0" encoding="utf-8"?>
 <p:tagLst xmlns:a="http://schemas.openxmlformats.org/drawingml/2006/main" xmlns:r="http://schemas.openxmlformats.org/officeDocument/2006/relationships" xmlns:p="http://schemas.openxmlformats.org/presentationml/2006/main">
   <p:tag name="OUTPUTDPI" val=" 3000"/>
   <p:tag name="ORIGINALHEIGHT" val=" 311"/>
@@ -5730,7 +5719,7 @@
 </p:tagLst>
 </file>
 
-<file path=ppt/tags/tag17.xml><?xml version="1.0" encoding="utf-8"?>
+<file path=ppt/tags/tag16.xml><?xml version="1.0" encoding="utf-8"?>
 <p:tagLst xmlns:a="http://schemas.openxmlformats.org/drawingml/2006/main" xmlns:r="http://schemas.openxmlformats.org/officeDocument/2006/relationships" xmlns:p="http://schemas.openxmlformats.org/presentationml/2006/main">
   <p:tag name="OUTPUTDPI" val=" 1200"/>
   <p:tag name="ORIGINALHEIGHT" val=" 75"/>
@@ -5752,7 +5741,7 @@
 </p:tagLst>
 </file>
 
-<file path=ppt/tags/tag18.xml><?xml version="1.0" encoding="utf-8"?>
+<file path=ppt/tags/tag17.xml><?xml version="1.0" encoding="utf-8"?>
 <p:tagLst xmlns:a="http://schemas.openxmlformats.org/drawingml/2006/main" xmlns:r="http://schemas.openxmlformats.org/officeDocument/2006/relationships" xmlns:p="http://schemas.openxmlformats.org/presentationml/2006/main">
   <p:tag name="OUTPUTDPI" val=" 1200"/>
   <p:tag name="ORIGINALHEIGHT" val=" 125"/>
@@ -5774,7 +5763,7 @@
 </p:tagLst>
 </file>
 
-<file path=ppt/tags/tag19.xml><?xml version="1.0" encoding="utf-8"?>
+<file path=ppt/tags/tag18.xml><?xml version="1.0" encoding="utf-8"?>
 <p:tagLst xmlns:a="http://schemas.openxmlformats.org/drawingml/2006/main" xmlns:r="http://schemas.openxmlformats.org/officeDocument/2006/relationships" xmlns:p="http://schemas.openxmlformats.org/presentationml/2006/main">
   <p:tag name="OUTPUTDPI" val=" 1200"/>
   <p:tag name="ORIGINALHEIGHT" val=" 108"/>
@@ -5784,6 +5773,28 @@
   <p:tag name="LATEXADDIN" val="\documentclass{article}&#10;\usepackage{amsmath}&#10;\usepackage{color}&#10;\pagestyle{empty}&#10;\begin{document}&#10;&#10;&#10;$m = 1, \hdots, N_t$&#10;&#10;&#10;\end{document}"/>
   <p:tag name="IGUANATEXSIZE" val="20"/>
   <p:tag name="IGUANATEXCURSOR" val="120"/>
+  <p:tag name="TRANSPARENCY" val="True"/>
+  <p:tag name="CHOOSECOLOR" val="False"/>
+  <p:tag name="COLORHEX" val="000000"/>
+  <p:tag name="LATEXENGINEID" val="0"/>
+  <p:tag name="TEMPFOLDER" val="/Users/yushuai/Library/Containers/com.microsoft.Powerpoint/Data/tmp/TemporaryItems/"/>
+  <p:tag name="LATEXFORMHEIGHT" val=" 426.65"/>
+  <p:tag name="LATEXFORMWIDTH" val=" 513.35"/>
+  <p:tag name="LATEXFORMWRAP" val="True"/>
+  <p:tag name="BITMAPVECTOR" val="0"/>
+</p:tagLst>
+</file>
+
+<file path=ppt/tags/tag19.xml><?xml version="1.0" encoding="utf-8"?>
+<p:tagLst xmlns:a="http://schemas.openxmlformats.org/drawingml/2006/main" xmlns:r="http://schemas.openxmlformats.org/officeDocument/2006/relationships" xmlns:p="http://schemas.openxmlformats.org/presentationml/2006/main">
+  <p:tag name="OUTPUTDPI" val=" 1200"/>
+  <p:tag name="ORIGINALHEIGHT" val=" 125"/>
+  <p:tag name="ORIGINALWIDTH" val=" 573"/>
+  <p:tag name="OUTPUTTYPE" val="PNG"/>
+  <p:tag name="IGUANATEXVERSION" val="162"/>
+  <p:tag name="LATEXADDIN" val="\documentclass{article}&#10;\usepackage{amsmath}&#10;\pagestyle{empty}&#10;\begin{document}&#10;&#10;&#10;$\partial_t u = f(u)$&#10;&#10;&#10;\end{document}"/>
+  <p:tag name="IGUANATEXSIZE" val="20"/>
+  <p:tag name="IGUANATEXCURSOR" val="103"/>
   <p:tag name="TRANSPARENCY" val="True"/>
   <p:tag name="CHOOSECOLOR" val="False"/>
   <p:tag name="COLORHEX" val="000000"/>
@@ -5819,28 +5830,6 @@
 </file>
 
 <file path=ppt/tags/tag20.xml><?xml version="1.0" encoding="utf-8"?>
-<p:tagLst xmlns:a="http://schemas.openxmlformats.org/drawingml/2006/main" xmlns:r="http://schemas.openxmlformats.org/officeDocument/2006/relationships" xmlns:p="http://schemas.openxmlformats.org/presentationml/2006/main">
-  <p:tag name="OUTPUTDPI" val=" 1200"/>
-  <p:tag name="ORIGINALHEIGHT" val=" 125"/>
-  <p:tag name="ORIGINALWIDTH" val=" 573"/>
-  <p:tag name="OUTPUTTYPE" val="PNG"/>
-  <p:tag name="IGUANATEXVERSION" val="162"/>
-  <p:tag name="LATEXADDIN" val="\documentclass{article}&#10;\usepackage{amsmath}&#10;\pagestyle{empty}&#10;\begin{document}&#10;&#10;&#10;$\partial_t u = f(u)$&#10;&#10;&#10;\end{document}"/>
-  <p:tag name="IGUANATEXSIZE" val="20"/>
-  <p:tag name="IGUANATEXCURSOR" val="103"/>
-  <p:tag name="TRANSPARENCY" val="True"/>
-  <p:tag name="CHOOSECOLOR" val="False"/>
-  <p:tag name="COLORHEX" val="000000"/>
-  <p:tag name="LATEXENGINEID" val="0"/>
-  <p:tag name="TEMPFOLDER" val="/Users/yushuai/Library/Containers/com.microsoft.Powerpoint/Data/tmp/TemporaryItems/"/>
-  <p:tag name="LATEXFORMHEIGHT" val=" 426.65"/>
-  <p:tag name="LATEXFORMWIDTH" val=" 513.35"/>
-  <p:tag name="LATEXFORMWRAP" val="True"/>
-  <p:tag name="BITMAPVECTOR" val="0"/>
-</p:tagLst>
-</file>
-
-<file path=ppt/tags/tag21.xml><?xml version="1.0" encoding="utf-8"?>
 <p:tagLst xmlns:a="http://schemas.openxmlformats.org/drawingml/2006/main" xmlns:r="http://schemas.openxmlformats.org/officeDocument/2006/relationships" xmlns:p="http://schemas.openxmlformats.org/presentationml/2006/main">
   <p:tag name="OUTPUTDPI" val=" 3000"/>
   <p:tag name="ORIGINALHEIGHT" val=" 311"/>
@@ -5908,13 +5897,6 @@
 
 <file path=ppt/tags/tag5.xml><?xml version="1.0" encoding="utf-8"?>
 <p:tagLst xmlns:a="http://schemas.openxmlformats.org/drawingml/2006/main" xmlns:r="http://schemas.openxmlformats.org/officeDocument/2006/relationships" xmlns:p="http://schemas.openxmlformats.org/presentationml/2006/main">
-  <p:tag name="SELECTIONNAME" val="Group 19"/>
-  <p:tag name="LAYER" val="2"/>
-</p:tagLst>
-</file>
-
-<file path=ppt/tags/tag6.xml><?xml version="1.0" encoding="utf-8"?>
-<p:tagLst xmlns:a="http://schemas.openxmlformats.org/drawingml/2006/main" xmlns:r="http://schemas.openxmlformats.org/officeDocument/2006/relationships" xmlns:p="http://schemas.openxmlformats.org/presentationml/2006/main">
   <p:tag name="OUTPUTDPI" val=" 3000"/>
   <p:tag name="ORIGINALHEIGHT" val=" 311"/>
   <p:tag name="ORIGINALWIDTH" val=" 558"/>
@@ -5935,7 +5917,7 @@
 </p:tagLst>
 </file>
 
-<file path=ppt/tags/tag7.xml><?xml version="1.0" encoding="utf-8"?>
+<file path=ppt/tags/tag6.xml><?xml version="1.0" encoding="utf-8"?>
 <p:tagLst xmlns:a="http://schemas.openxmlformats.org/drawingml/2006/main" xmlns:r="http://schemas.openxmlformats.org/officeDocument/2006/relationships" xmlns:p="http://schemas.openxmlformats.org/presentationml/2006/main">
   <p:tag name="OUTPUTDPI" val=" 3000"/>
   <p:tag name="ORIGINALHEIGHT" val=" 272"/>
@@ -5957,16 +5939,38 @@
 </p:tagLst>
 </file>
 
-<file path=ppt/tags/tag8.xml><?xml version="1.0" encoding="utf-8"?>
+<file path=ppt/tags/tag7.xml><?xml version="1.0" encoding="utf-8"?>
 <p:tagLst xmlns:a="http://schemas.openxmlformats.org/drawingml/2006/main" xmlns:r="http://schemas.openxmlformats.org/officeDocument/2006/relationships" xmlns:p="http://schemas.openxmlformats.org/presentationml/2006/main">
   <p:tag name="OUTPUTDPI" val=" 3000"/>
   <p:tag name="ORIGINALHEIGHT" val=" 910"/>
-  <p:tag name="ORIGINALWIDTH" val=" 10693"/>
+  <p:tag name="ORIGINALWIDTH" val=" 11381"/>
   <p:tag name="OUTPUTTYPE" val="PNG"/>
   <p:tag name="IGUANATEXVERSION" val="162"/>
-  <p:tag name="LATEXADDIN" val="\documentclass{article}&#10;\usepackage{amsmath,amssymb,amsfonts}&#10;\usepackage{color}&#10;\pagestyle{empty}&#10;\begin{document}&#10;&#10;&#10;\begin{equation}&#10;\sum_{m = 1}^{N_t}\sum_{i = 1}^{n}\bigg[g_i(a(t_m)) - f_i(t_m)\bigg]^2 + \bigg[\frac{h(a(t_m))}{\langle\partial_x\hat{u}(t_m), \partial_x u_0\rangle}\langle\partial_x\hat{u}, \varphi_i\rangle - \dot{c}(t_m)\langle\partial_x\hat{u}(t_m), \varphi_i\rangle\bigg]^2\notag&#10;\end{equation}&#10;&#10;&#10;\end{document}"/>
+  <p:tag name="LATEXADDIN" val="\documentclass{article}&#10;\usepackage{amsmath,amssymb,amsfonts}&#10;\usepackage{color}&#10;\pagestyle{empty}&#10;\begin{document}&#10;&#10;&#10;\begin{equation}&#10;\sum_{m = 1}^{N_t}\sum_{i = 1}^{n}\bigg[g_i(a(t_m)) - f_i(t_m)\bigg]^2 + \beta\bigg[\frac{h(a(t_m))}{\langle\partial_x\hat{u}(t_m), \partial_x u_0\rangle}\langle\partial_x\hat{u}, \varphi_i\rangle - \dot{c}(t_m)\langle\partial_x\hat{u}(t_m), \varphi_i\rangle\bigg]^2 + R\notag&#10;\end{equation}&#10;&#10;&#10;\end{document}"/>
   <p:tag name="IGUANATEXSIZE" val="20"/>
-  <p:tag name="IGUANATEXCURSOR" val="402"/>
+  <p:tag name="IGUANATEXCURSOR" val="405"/>
+  <p:tag name="TRANSPARENCY" val="True"/>
+  <p:tag name="CHOOSECOLOR" val="False"/>
+  <p:tag name="COLORHEX" val="000000"/>
+  <p:tag name="LATEXENGINEID" val="0"/>
+  <p:tag name="TEMPFOLDER" val="/Users/yushuai/Library/Containers/com.microsoft.Powerpoint/Data/tmp/TemporaryItems/"/>
+  <p:tag name="LATEXFORMHEIGHT" val=" 426.65"/>
+  <p:tag name="LATEXFORMWIDTH" val=" 513.35"/>
+  <p:tag name="LATEXFORMWRAP" val="True"/>
+  <p:tag name="BITMAPVECTOR" val="0"/>
+</p:tagLst>
+</file>
+
+<file path=ppt/tags/tag8.xml><?xml version="1.0" encoding="utf-8"?>
+<p:tagLst xmlns:a="http://schemas.openxmlformats.org/drawingml/2006/main" xmlns:r="http://schemas.openxmlformats.org/officeDocument/2006/relationships" xmlns:p="http://schemas.openxmlformats.org/presentationml/2006/main">
+  <p:tag name="OUTPUTDPI" val=" 1200"/>
+  <p:tag name="ORIGINALHEIGHT" val=" 294"/>
+  <p:tag name="ORIGINALWIDTH" val=" 3510"/>
+  <p:tag name="OUTPUTTYPE" val="PNG"/>
+  <p:tag name="IGUANATEXVERSION" val="162"/>
+  <p:tag name="LATEXADDIN" val="\documentclass{article}&#10;\usepackage{amsmath,amssymb,amsfonts}&#10;\usepackage{color}&#10;\pagestyle{empty}&#10;\begin{document}&#10;&#10;&#10;\begin{equation}&#10;\partial_t \hat{u} = f(\hat{u}) -\frac{\langle f(\hat{u}), \partial_x u_0\rangle}{\langle\partial_x \hat{u}, \partial_x u_0\rangle}\partial_x\hat{u}\Longrightarrow \textcolor{blue}{\frac{\mathrm{d}a_i}{\mathrm{d}t} = g_i(a) - \frac{h(a)}{\langle\partial_x \hat{u}, \partial_x u_0\rangle}\partial_x\hat{u}}\notag&#10;\end{equation}&#10;&#10;&#10;\end{document}"/>
+  <p:tag name="IGUANATEXSIZE" val="20"/>
+  <p:tag name="IGUANATEXCURSOR" val="266"/>
   <p:tag name="TRANSPARENCY" val="True"/>
   <p:tag name="CHOOSECOLOR" val="False"/>
   <p:tag name="COLORHEX" val="000000"/>
@@ -5981,23 +5985,8 @@
 
 <file path=ppt/tags/tag9.xml><?xml version="1.0" encoding="utf-8"?>
 <p:tagLst xmlns:a="http://schemas.openxmlformats.org/drawingml/2006/main" xmlns:r="http://schemas.openxmlformats.org/officeDocument/2006/relationships" xmlns:p="http://schemas.openxmlformats.org/presentationml/2006/main">
-  <p:tag name="OUTPUTDPI" val=" 1200"/>
-  <p:tag name="ORIGINALHEIGHT" val=" 294"/>
-  <p:tag name="ORIGINALWIDTH" val=" 3051"/>
-  <p:tag name="OUTPUTTYPE" val="PNG"/>
-  <p:tag name="IGUANATEXVERSION" val="162"/>
-  <p:tag name="LATEXADDIN" val="\documentclass{article}&#10;\usepackage{amsmath,amssymb,amsfonts}&#10;\usepackage{color}&#10;\pagestyle{empty}&#10;\begin{document}&#10;&#10;&#10;\begin{equation}&#10;\partial_t \hat{u} = f(\hat{u}) - \dot{c}(\hat{u})\partial_x\hat{u}\Longrightarrow \textcolor{blue}{\frac{\mathrm{d}a_i}{\mathrm{d}t} = g_i(a) - \frac{h(a)}{\langle\partial_x \hat{u}, \partial_x u_0\rangle}\partial_x\hat{u}}\notag&#10;\end{equation}&#10;&#10;&#10;\end{document}"/>
-  <p:tag name="IGUANATEXSIZE" val="20"/>
-  <p:tag name="IGUANATEXCURSOR" val="185"/>
-  <p:tag name="TRANSPARENCY" val="True"/>
-  <p:tag name="CHOOSECOLOR" val="False"/>
-  <p:tag name="COLORHEX" val="000000"/>
-  <p:tag name="LATEXENGINEID" val="0"/>
-  <p:tag name="TEMPFOLDER" val="/Users/yushuai/Library/Containers/com.microsoft.Powerpoint/Data/tmp/TemporaryItems/"/>
-  <p:tag name="LATEXFORMHEIGHT" val=" 426.65"/>
-  <p:tag name="LATEXFORMWIDTH" val=" 513.35"/>
-  <p:tag name="LATEXFORMWRAP" val="True"/>
-  <p:tag name="BITMAPVECTOR" val="0"/>
+  <p:tag name="SELECTIONNAME" val="Group 105"/>
+  <p:tag name="LAYER" val="2"/>
 </p:tagLst>
 </file>
 

</xml_diff>